<commit_message>
entry overrides for * and -
</commit_message>
<xml_diff>
--- a/Tlön.pptx
+++ b/Tlön.pptx
@@ -6,6 +6,7 @@
   </p:sldMasterIdLst>
   <p:sldIdLst>
     <p:sldId id="256" r:id="rId2"/>
+    <p:sldId id="257" r:id="rId3"/>
   </p:sldIdLst>
   <p:sldSz cx="12192000" cy="6858000"/>
   <p:notesSz cx="6858000" cy="9144000"/>
@@ -104,6 +105,11 @@
       </a:defRPr>
     </a:lvl9pPr>
   </p:defaultTextStyle>
+  <p:extLst>
+    <p:ext uri="{EFAFB233-063F-42B5-8137-9DF3F51BA10A}">
+      <p15:sldGuideLst xmlns:p15="http://schemas.microsoft.com/office/powerpoint/2012/main"/>
+    </p:ext>
+  </p:extLst>
 </p:presentation>
 </file>
 
@@ -701,12 +707,12 @@
   <p:extLst mod="1">
     <p:ext uri="{DCECCB84-F9BA-43D5-87BE-67443E8EF086}">
       <p15:sldGuideLst xmlns:p15="http://schemas.microsoft.com/office/powerpoint/2012/main">
-        <p15:guide id="4294967295" orient="horz" pos="1152">
+        <p15:guide id="1" orient="horz" pos="1152">
           <p15:clr>
             <a:srgbClr val="FBAE40"/>
           </p15:clr>
         </p15:guide>
-        <p15:guide id="4294967295" pos="3840">
+        <p15:guide id="2" pos="3840">
           <p15:clr>
             <a:srgbClr val="FBAE40"/>
           </p15:clr>
@@ -931,12 +937,12 @@
   <p:extLst mod="1">
     <p:ext uri="{DCECCB84-F9BA-43D5-87BE-67443E8EF086}">
       <p15:sldGuideLst xmlns:p15="http://schemas.microsoft.com/office/powerpoint/2012/main">
-        <p15:guide id="4294967295" orient="horz" pos="1152">
+        <p15:guide id="1" orient="horz" pos="1152">
           <p15:clr>
             <a:srgbClr val="FBAE40"/>
           </p15:clr>
         </p15:guide>
-        <p15:guide id="4294967295" pos="3840">
+        <p15:guide id="2" pos="3840">
           <p15:clr>
             <a:srgbClr val="FBAE40"/>
           </p15:clr>
@@ -1203,12 +1209,12 @@
   <p:extLst mod="1">
     <p:ext uri="{DCECCB84-F9BA-43D5-87BE-67443E8EF086}">
       <p15:sldGuideLst xmlns:p15="http://schemas.microsoft.com/office/powerpoint/2012/main">
-        <p15:guide id="4294967295" orient="horz" pos="1152">
+        <p15:guide id="1" orient="horz" pos="1152">
           <p15:clr>
             <a:srgbClr val="FBAE40"/>
           </p15:clr>
         </p15:guide>
-        <p15:guide id="4294967295" pos="3840">
+        <p15:guide id="2" pos="3840">
           <p15:clr>
             <a:srgbClr val="FBAE40"/>
           </p15:clr>
@@ -1517,12 +1523,12 @@
   <p:extLst mod="1">
     <p:ext uri="{DCECCB84-F9BA-43D5-87BE-67443E8EF086}">
       <p15:sldGuideLst xmlns:p15="http://schemas.microsoft.com/office/powerpoint/2012/main">
-        <p15:guide id="4294967295" orient="horz" pos="1152">
+        <p15:guide id="1" orient="horz" pos="1152">
           <p15:clr>
             <a:srgbClr val="FBAE40"/>
           </p15:clr>
         </p15:guide>
-        <p15:guide id="4294967295" pos="3840">
+        <p15:guide id="2" pos="3840">
           <p15:clr>
             <a:srgbClr val="FBAE40"/>
           </p15:clr>
@@ -1873,12 +1879,12 @@
   <p:extLst mod="1">
     <p:ext uri="{DCECCB84-F9BA-43D5-87BE-67443E8EF086}">
       <p15:sldGuideLst xmlns:p15="http://schemas.microsoft.com/office/powerpoint/2012/main">
-        <p15:guide id="4294967295" orient="horz" pos="1152">
+        <p15:guide id="1" orient="horz" pos="1152">
           <p15:clr>
             <a:srgbClr val="FBAE40"/>
           </p15:clr>
         </p15:guide>
-        <p15:guide id="4294967295" pos="3840">
+        <p15:guide id="2" pos="3840">
           <p15:clr>
             <a:srgbClr val="FBAE40"/>
           </p15:clr>
@@ -3985,12 +3991,12 @@
   <p:extLst mod="1">
     <p:ext uri="{DCECCB84-F9BA-43D5-87BE-67443E8EF086}">
       <p15:sldGuideLst xmlns:p15="http://schemas.microsoft.com/office/powerpoint/2012/main">
-        <p15:guide id="4294967295" orient="horz" pos="2160">
+        <p15:guide id="1" orient="horz" pos="2160">
           <p15:clr>
             <a:srgbClr val="FBAE40"/>
           </p15:clr>
         </p15:guide>
-        <p15:guide id="4294967295" pos="3264">
+        <p15:guide id="2" pos="3264">
           <p15:clr>
             <a:srgbClr val="FBAE40"/>
           </p15:clr>
@@ -7680,12 +7686,12 @@
   <p:extLst mod="1">
     <p:ext uri="{DCECCB84-F9BA-43D5-87BE-67443E8EF086}">
       <p15:sldGuideLst xmlns:p15="http://schemas.microsoft.com/office/powerpoint/2012/main">
-        <p15:guide id="4294967295" orient="horz" pos="2160">
+        <p15:guide id="1" orient="horz" pos="2160">
           <p15:clr>
             <a:srgbClr val="FBAE40"/>
           </p15:clr>
         </p15:guide>
-        <p15:guide id="4294967295" pos="3840">
+        <p15:guide id="2" pos="3840">
           <p15:clr>
             <a:srgbClr val="FBAE40"/>
           </p15:clr>
@@ -7792,12 +7798,12 @@
   <p:extLst mod="1">
     <p:ext uri="{DCECCB84-F9BA-43D5-87BE-67443E8EF086}">
       <p15:sldGuideLst xmlns:p15="http://schemas.microsoft.com/office/powerpoint/2012/main">
-        <p15:guide id="4294967295" orient="horz" pos="2160">
+        <p15:guide id="1" orient="horz" pos="2160">
           <p15:clr>
             <a:srgbClr val="FBAE40"/>
           </p15:clr>
         </p15:guide>
-        <p15:guide id="4294967295" pos="3840">
+        <p15:guide id="2" pos="3840">
           <p15:clr>
             <a:srgbClr val="FBAE40"/>
           </p15:clr>
@@ -8248,7 +8254,7 @@
           <a:p>
             <a:fld id="{7BC56AAD-B169-43E4-932E-91C7AA065D04}" type="datetimeFigureOut">
               <a:rPr lang="en-GB" smtClean="0"/>
-              <a:t>12/09/2016</a:t>
+              <a:t>19/09/2016</a:t>
             </a:fld>
             <a:endParaRPr lang="en-GB"/>
           </a:p>
@@ -8461,12 +8467,12 @@
   <p:extLst mod="1">
     <p:ext uri="{DCECCB84-F9BA-43D5-87BE-67443E8EF086}">
       <p15:sldGuideLst xmlns:p15="http://schemas.microsoft.com/office/powerpoint/2012/main">
-        <p15:guide id="4294967295" orient="horz" pos="2160">
+        <p15:guide id="1" orient="horz" pos="2160">
           <p15:clr>
             <a:srgbClr val="FBAE40"/>
           </p15:clr>
         </p15:guide>
-        <p15:guide id="4294967295" pos="3840">
+        <p15:guide id="2" pos="3840">
           <p15:clr>
             <a:srgbClr val="FBAE40"/>
           </p15:clr>
@@ -9890,12 +9896,12 @@
   <p:extLst mod="1">
     <p:ext uri="{DCECCB84-F9BA-43D5-87BE-67443E8EF086}">
       <p15:sldGuideLst xmlns:p15="http://schemas.microsoft.com/office/powerpoint/2012/main">
-        <p15:guide id="4294967295" orient="horz" pos="2160">
+        <p15:guide id="1" orient="horz" pos="2160">
           <p15:clr>
             <a:srgbClr val="FBAE40"/>
           </p15:clr>
         </p15:guide>
-        <p15:guide id="4294967295" pos="3264">
+        <p15:guide id="2" pos="3264">
           <p15:clr>
             <a:srgbClr val="FBAE40"/>
           </p15:clr>
@@ -10185,12 +10191,12 @@
   <p:extLst mod="1">
     <p:ext uri="{DCECCB84-F9BA-43D5-87BE-67443E8EF086}">
       <p15:sldGuideLst xmlns:p15="http://schemas.microsoft.com/office/powerpoint/2012/main">
-        <p15:guide id="4294967295" orient="horz" pos="1152">
+        <p15:guide id="1" orient="horz" pos="1152">
           <p15:clr>
             <a:srgbClr val="FBAE40"/>
           </p15:clr>
         </p15:guide>
-        <p15:guide id="4294967295" pos="3840">
+        <p15:guide id="2" pos="3840">
           <p15:clr>
             <a:srgbClr val="FBAE40"/>
           </p15:clr>
@@ -10563,12 +10569,12 @@
   <p:extLst mod="1">
     <p:ext uri="{DCECCB84-F9BA-43D5-87BE-67443E8EF086}">
       <p15:sldGuideLst xmlns:p15="http://schemas.microsoft.com/office/powerpoint/2012/main">
-        <p15:guide id="4294967295" orient="horz" pos="1152">
+        <p15:guide id="1" orient="horz" pos="1152">
           <p15:clr>
             <a:srgbClr val="FBAE40"/>
           </p15:clr>
         </p15:guide>
-        <p15:guide id="4294967295" pos="3840">
+        <p15:guide id="2" pos="3840">
           <p15:clr>
             <a:srgbClr val="FBAE40"/>
           </p15:clr>
@@ -11021,12 +11027,12 @@
   <p:extLst mod="1">
     <p:ext uri="{DCECCB84-F9BA-43D5-87BE-67443E8EF086}">
       <p15:sldGuideLst xmlns:p15="http://schemas.microsoft.com/office/powerpoint/2012/main">
-        <p15:guide id="4294967295" orient="horz" pos="1152">
+        <p15:guide id="1" orient="horz" pos="1152">
           <p15:clr>
             <a:srgbClr val="FBAE40"/>
           </p15:clr>
         </p15:guide>
-        <p15:guide id="4294967295" pos="3840">
+        <p15:guide id="2" pos="3840">
           <p15:clr>
             <a:srgbClr val="FBAE40"/>
           </p15:clr>
@@ -11639,12 +11645,12 @@
   <p:extLst mod="1">
     <p:ext uri="{DCECCB84-F9BA-43D5-87BE-67443E8EF086}">
       <p15:sldGuideLst xmlns:p15="http://schemas.microsoft.com/office/powerpoint/2012/main">
-        <p15:guide id="4294967295" orient="horz" pos="1152">
+        <p15:guide id="1" orient="horz" pos="1152">
           <p15:clr>
             <a:srgbClr val="FBAE40"/>
           </p15:clr>
         </p15:guide>
-        <p15:guide id="4294967295" pos="3840">
+        <p15:guide id="2" pos="3840">
           <p15:clr>
             <a:srgbClr val="FBAE40"/>
           </p15:clr>
@@ -12486,6 +12492,211 @@
 </p:sld>
 </file>
 
+<file path=ppt/slides/slide2.xml><?xml version="1.0" encoding="utf-8"?>
+<p:sld xmlns:a="http://schemas.openxmlformats.org/drawingml/2006/main" xmlns:r="http://schemas.openxmlformats.org/officeDocument/2006/relationships" xmlns:p="http://schemas.openxmlformats.org/presentationml/2006/main">
+  <p:cSld>
+    <p:spTree>
+      <p:nvGrpSpPr>
+        <p:cNvPr id="1" name=""/>
+        <p:cNvGrpSpPr/>
+        <p:nvPr/>
+      </p:nvGrpSpPr>
+      <p:grpSpPr>
+        <a:xfrm>
+          <a:off x="0" y="0"/>
+          <a:ext cx="0" cy="0"/>
+          <a:chOff x="0" y="0"/>
+          <a:chExt cx="0" cy="0"/>
+        </a:xfrm>
+      </p:grpSpPr>
+      <p:sp>
+        <p:nvSpPr>
+          <p:cNvPr id="5" name="Text Placeholder 4"/>
+          <p:cNvSpPr>
+            <a:spLocks noGrp="1"/>
+          </p:cNvSpPr>
+          <p:nvPr>
+            <p:ph type="body" sz="quarter" idx="10"/>
+          </p:nvPr>
+        </p:nvSpPr>
+        <p:spPr/>
+        <p:txBody>
+          <a:bodyPr/>
+          <a:lstStyle/>
+          <a:p>
+            <a:r>
+              <a:rPr lang="en-US" sz="4800" dirty="0" smtClean="0">
+                <a:latin typeface="PragmataPro" panose="02000500030000020004" pitchFamily="2" charset="0"/>
+                <a:ea typeface="PragmataPro" panose="02000500030000020004" pitchFamily="2" charset="0"/>
+                <a:cs typeface="PragmataPro" panose="02000500030000020004" pitchFamily="2" charset="0"/>
+              </a:rPr>
+              <a:t>class </a:t>
+            </a:r>
+            <a:r>
+              <a:rPr lang="en-US" sz="4800" dirty="0" err="1" smtClean="0">
+                <a:latin typeface="PragmataPro" panose="02000500030000020004" pitchFamily="2" charset="0"/>
+                <a:ea typeface="PragmataPro" panose="02000500030000020004" pitchFamily="2" charset="0"/>
+                <a:cs typeface="PragmataPro" panose="02000500030000020004" pitchFamily="2" charset="0"/>
+              </a:rPr>
+              <a:t>My.Point</a:t>
+            </a:r>
+            <a:r>
+              <a:rPr lang="en-US" sz="4800" dirty="0" smtClean="0">
+                <a:latin typeface="PragmataPro" panose="02000500030000020004" pitchFamily="2" charset="0"/>
+                <a:ea typeface="PragmataPro" panose="02000500030000020004" pitchFamily="2" charset="0"/>
+                <a:cs typeface="PragmataPro" panose="02000500030000020004" pitchFamily="2" charset="0"/>
+              </a:rPr>
+              <a:t>(</a:t>
+            </a:r>
+            <a:r>
+              <a:rPr lang="en-US" sz="4800" dirty="0" err="1" smtClean="0">
+                <a:latin typeface="PragmataPro" panose="02000500030000020004" pitchFamily="2" charset="0"/>
+                <a:ea typeface="PragmataPro" panose="02000500030000020004" pitchFamily="2" charset="0"/>
+                <a:cs typeface="PragmataPro" panose="02000500030000020004" pitchFamily="2" charset="0"/>
+              </a:rPr>
+              <a:t>xy</a:t>
+            </a:r>
+            <a:r>
+              <a:rPr lang="en-US" sz="4800" dirty="0" smtClean="0">
+                <a:latin typeface="PragmataPro" panose="02000500030000020004" pitchFamily="2" charset="0"/>
+                <a:ea typeface="PragmataPro" panose="02000500030000020004" pitchFamily="2" charset="0"/>
+                <a:cs typeface="PragmataPro" panose="02000500030000020004" pitchFamily="2" charset="0"/>
+              </a:rPr>
+              <a:t>:(i32,i32))</a:t>
+            </a:r>
+            <a:r>
+              <a:rPr lang="en-US" sz="4800" dirty="0">
+                <a:latin typeface="PragmataPro" panose="02000500030000020004" pitchFamily="2" charset="0"/>
+                <a:ea typeface="PragmataPro" panose="02000500030000020004" pitchFamily="2" charset="0"/>
+                <a:cs typeface="PragmataPro" panose="02000500030000020004" pitchFamily="2" charset="0"/>
+              </a:rPr>
+              <a:t/>
+            </a:r>
+            <a:br>
+              <a:rPr lang="en-US" sz="4800" dirty="0">
+                <a:latin typeface="PragmataPro" panose="02000500030000020004" pitchFamily="2" charset="0"/>
+                <a:ea typeface="PragmataPro" panose="02000500030000020004" pitchFamily="2" charset="0"/>
+                <a:cs typeface="PragmataPro" panose="02000500030000020004" pitchFamily="2" charset="0"/>
+              </a:rPr>
+            </a:br>
+            <a:r>
+              <a:rPr lang="en-US" sz="4800" dirty="0" smtClean="0">
+                <a:latin typeface="PragmataPro" panose="02000500030000020004" pitchFamily="2" charset="0"/>
+                <a:ea typeface="PragmataPro" panose="02000500030000020004" pitchFamily="2" charset="0"/>
+                <a:cs typeface="PragmataPro" panose="02000500030000020004" pitchFamily="2" charset="0"/>
+              </a:rPr>
+              <a:t>{</a:t>
+            </a:r>
+            <a:br>
+              <a:rPr lang="en-US" sz="4800" dirty="0" smtClean="0">
+                <a:latin typeface="PragmataPro" panose="02000500030000020004" pitchFamily="2" charset="0"/>
+                <a:ea typeface="PragmataPro" panose="02000500030000020004" pitchFamily="2" charset="0"/>
+                <a:cs typeface="PragmataPro" panose="02000500030000020004" pitchFamily="2" charset="0"/>
+              </a:rPr>
+            </a:br>
+            <a:r>
+              <a:rPr lang="en-US" sz="4800" smtClean="0">
+                <a:latin typeface="PragmataPro" panose="02000500030000020004" pitchFamily="2" charset="0"/>
+                <a:ea typeface="PragmataPro" panose="02000500030000020004" pitchFamily="2" charset="0"/>
+                <a:cs typeface="PragmataPro" panose="02000500030000020004" pitchFamily="2" charset="0"/>
+              </a:rPr>
+              <a:t>  </a:t>
+            </a:r>
+            <a:r>
+              <a:rPr lang="en-US" sz="4800" smtClean="0">
+                <a:latin typeface="PragmataPro" panose="02000500030000020004" pitchFamily="2" charset="0"/>
+                <a:ea typeface="PragmataPro" panose="02000500030000020004" pitchFamily="2" charset="0"/>
+                <a:cs typeface="PragmataPro" panose="02000500030000020004" pitchFamily="2" charset="0"/>
+              </a:rPr>
+              <a:t>distance := () -&gt; i32 { … }</a:t>
+            </a:r>
+            <a:r>
+              <a:rPr lang="en-US" sz="4800" dirty="0">
+                <a:latin typeface="PragmataPro" panose="02000500030000020004" pitchFamily="2" charset="0"/>
+                <a:ea typeface="PragmataPro" panose="02000500030000020004" pitchFamily="2" charset="0"/>
+                <a:cs typeface="PragmataPro" panose="02000500030000020004" pitchFamily="2" charset="0"/>
+              </a:rPr>
+              <a:t/>
+            </a:r>
+            <a:br>
+              <a:rPr lang="en-US" sz="4800" dirty="0">
+                <a:latin typeface="PragmataPro" panose="02000500030000020004" pitchFamily="2" charset="0"/>
+                <a:ea typeface="PragmataPro" panose="02000500030000020004" pitchFamily="2" charset="0"/>
+                <a:cs typeface="PragmataPro" panose="02000500030000020004" pitchFamily="2" charset="0"/>
+              </a:rPr>
+            </a:br>
+            <a:r>
+              <a:rPr lang="en-US" sz="4800" dirty="0" smtClean="0">
+                <a:latin typeface="PragmataPro" panose="02000500030000020004" pitchFamily="2" charset="0"/>
+                <a:ea typeface="PragmataPro" panose="02000500030000020004" pitchFamily="2" charset="0"/>
+                <a:cs typeface="PragmataPro" panose="02000500030000020004" pitchFamily="2" charset="0"/>
+              </a:rPr>
+              <a:t>}</a:t>
+            </a:r>
+            <a:endParaRPr lang="en-GB" sz="4800" dirty="0">
+              <a:latin typeface="PragmataPro" panose="02000500030000020004" pitchFamily="2" charset="0"/>
+              <a:ea typeface="PragmataPro" panose="02000500030000020004" pitchFamily="2" charset="0"/>
+              <a:cs typeface="PragmataPro" panose="02000500030000020004" pitchFamily="2" charset="0"/>
+            </a:endParaRPr>
+          </a:p>
+        </p:txBody>
+      </p:sp>
+      <p:sp>
+        <p:nvSpPr>
+          <p:cNvPr id="7" name="Title 6"/>
+          <p:cNvSpPr>
+            <a:spLocks noGrp="1"/>
+          </p:cNvSpPr>
+          <p:nvPr>
+            <p:ph type="title"/>
+          </p:nvPr>
+        </p:nvSpPr>
+        <p:spPr>
+          <a:xfrm>
+            <a:off x="701336" y="4094207"/>
+            <a:ext cx="10778971" cy="2314831"/>
+          </a:xfrm>
+        </p:spPr>
+        <p:txBody>
+          <a:bodyPr/>
+          <a:lstStyle/>
+          <a:p>
+            <a:r>
+              <a:rPr lang="en-GB" sz="8800" dirty="0" smtClean="0">
+                <a:latin typeface="Caspari" panose="02000503040000020003" pitchFamily="50" charset="0"/>
+                <a:ea typeface="PragmataPro" panose="02000500030000020004" pitchFamily="2" charset="0"/>
+                <a:cs typeface="PragmataPro" panose="02000500030000020004" pitchFamily="2" charset="0"/>
+              </a:rPr>
+              <a:t>Tuples and Class Functions</a:t>
+            </a:r>
+            <a:endParaRPr lang="en-GB" sz="8800" dirty="0">
+              <a:latin typeface="Caspari" panose="02000503040000020003" pitchFamily="50" charset="0"/>
+              <a:ea typeface="PragmataPro" panose="02000500030000020004" pitchFamily="2" charset="0"/>
+              <a:cs typeface="PragmataPro" panose="02000500030000020004" pitchFamily="2" charset="0"/>
+            </a:endParaRPr>
+          </a:p>
+        </p:txBody>
+      </p:sp>
+    </p:spTree>
+    <p:extLst>
+      <p:ext uri="{BB962C8B-B14F-4D97-AF65-F5344CB8AC3E}">
+        <p14:creationId xmlns:p14="http://schemas.microsoft.com/office/powerpoint/2010/main" val="1079670413"/>
+      </p:ext>
+    </p:extLst>
+  </p:cSld>
+  <p:clrMapOvr>
+    <a:masterClrMapping/>
+  </p:clrMapOvr>
+  <p:timing>
+    <p:tnLst>
+      <p:par>
+        <p:cTn id="1" dur="indefinite" restart="never" nodeType="tmRoot"/>
+      </p:par>
+    </p:tnLst>
+  </p:timing>
+</p:sld>
+</file>
+
 <file path=ppt/theme/theme1.xml><?xml version="1.0" encoding="utf-8"?>
 <a:theme xmlns:a="http://schemas.openxmlformats.org/drawingml/2006/main" name="PluralsightJan2016">
   <a:themeElements>

</xml_diff>